<commit_message>
added analysis / darpa slides
</commit_message>
<xml_diff>
--- a/analysis/darpa_summary.pptx
+++ b/analysis/darpa_summary.pptx
@@ -5,9 +5,8 @@
     <p:sldMasterId id="2147483648" r:id="rId1"/>
   </p:sldMasterIdLst>
   <p:sldIdLst>
-    <p:sldId id="256" r:id="rId2"/>
-    <p:sldId id="257" r:id="rId3"/>
-    <p:sldId id="258" r:id="rId4"/>
+    <p:sldId id="257" r:id="rId2"/>
+    <p:sldId id="258" r:id="rId3"/>
   </p:sldIdLst>
   <p:sldSz cx="12192000" cy="6858000"/>
   <p:notesSz cx="6858000" cy="9144000"/>
@@ -106,6 +105,11 @@
       </a:defRPr>
     </a:lvl9pPr>
   </p:defaultTextStyle>
+  <p:extLst>
+    <p:ext uri="{EFAFB233-063F-42B5-8137-9DF3F51BA10A}">
+      <p15:sldGuideLst xmlns:p15="http://schemas.microsoft.com/office/powerpoint/2012/main"/>
+    </p:ext>
+  </p:extLst>
 </p:presentation>
 </file>
 
@@ -2968,14 +2972,74 @@
       </p:grpSpPr>
       <p:pic>
         <p:nvPicPr>
-          <p:cNvPr id="4" name="Picture 3" descr="extra.ai"/>
+          <p:cNvPr id="3" name="Picture 2"/>
+          <p:cNvPicPr>
+            <a:picLocks noChangeAspect="1"/>
+          </p:cNvPicPr>
+          <p:nvPr/>
+        </p:nvPicPr>
+        <p:blipFill>
+          <a:blip r:embed="rId2">
+            <a:extLst>
+              <a:ext uri="{28A0092B-C50C-407E-A947-70E740481C1C}">
+                <a14:useLocalDpi xmlns:a14="http://schemas.microsoft.com/office/drawing/2010/main" val="0"/>
+              </a:ext>
+            </a:extLst>
+          </a:blip>
+          <a:stretch>
+            <a:fillRect/>
+          </a:stretch>
+        </p:blipFill>
+        <p:spPr>
+          <a:xfrm>
+            <a:off x="8028758" y="336018"/>
+            <a:ext cx="4163242" cy="3122431"/>
+          </a:xfrm>
+          <a:prstGeom prst="rect">
+            <a:avLst/>
+          </a:prstGeom>
+        </p:spPr>
+      </p:pic>
+      <p:pic>
+        <p:nvPicPr>
+          <p:cNvPr id="7" name="Picture 6"/>
+          <p:cNvPicPr>
+            <a:picLocks noChangeAspect="1"/>
+          </p:cNvPicPr>
+          <p:nvPr/>
+        </p:nvPicPr>
+        <p:blipFill>
+          <a:blip r:embed="rId3">
+            <a:extLst>
+              <a:ext uri="{28A0092B-C50C-407E-A947-70E740481C1C}">
+                <a14:useLocalDpi xmlns:a14="http://schemas.microsoft.com/office/drawing/2010/main" val="0"/>
+              </a:ext>
+            </a:extLst>
+          </a:blip>
+          <a:stretch>
+            <a:fillRect/>
+          </a:stretch>
+        </p:blipFill>
+        <p:spPr>
+          <a:xfrm>
+            <a:off x="8032844" y="3735568"/>
+            <a:ext cx="4159156" cy="3119368"/>
+          </a:xfrm>
+          <a:prstGeom prst="rect">
+            <a:avLst/>
+          </a:prstGeom>
+        </p:spPr>
+      </p:pic>
+      <p:pic>
+        <p:nvPicPr>
+          <p:cNvPr id="8" name="Picture 7" descr="extra.ai"/>
           <p:cNvPicPr>
             <a:picLocks noChangeAspect="1"/>
           </p:cNvPicPr>
           <p:nvPr/>
         </p:nvPicPr>
         <p:blipFill rotWithShape="1">
-          <a:blip r:embed="rId2">
+          <a:blip r:embed="rId4">
             <a:extLst>
               <a:ext uri="{28A0092B-C50C-407E-A947-70E740481C1C}">
                 <a14:useLocalDpi xmlns:a14="http://schemas.microsoft.com/office/drawing/2010/main" val="0"/>
@@ -2987,8 +3051,8 @@
         </p:blipFill>
         <p:spPr>
           <a:xfrm>
-            <a:off x="5260421" y="2225313"/>
-            <a:ext cx="1003053" cy="2407374"/>
+            <a:off x="1287675" y="4244420"/>
+            <a:ext cx="774285" cy="1858321"/>
           </a:xfrm>
           <a:prstGeom prst="rect">
             <a:avLst/>
@@ -2997,14 +3061,14 @@
       </p:pic>
       <p:sp>
         <p:nvSpPr>
-          <p:cNvPr id="5" name="TextBox 6"/>
+          <p:cNvPr id="9" name="TextBox 6"/>
           <p:cNvSpPr txBox="1"/>
           <p:nvPr/>
         </p:nvSpPr>
         <p:spPr>
           <a:xfrm>
-            <a:off x="5908556" y="2452418"/>
-            <a:ext cx="1023023" cy="1908215"/>
+            <a:off x="1840275" y="4357973"/>
+            <a:ext cx="1023023" cy="1538883"/>
           </a:xfrm>
           <a:prstGeom prst="rect">
             <a:avLst/>
@@ -3112,7 +3176,12 @@
           </a:lstStyle>
           <a:p>
             <a:r>
-              <a:rPr lang="en-US" sz="1600" dirty="0" smtClean="0">
+              <a:rPr lang="en-US" sz="1400" dirty="0" smtClean="0">
+                <a:solidFill>
+                  <a:schemeClr val="bg1">
+                    <a:lumMod val="50000"/>
+                  </a:schemeClr>
+                </a:solidFill>
                 <a:latin typeface="Helvetica"/>
                 <a:cs typeface="Helvetica"/>
               </a:rPr>
@@ -3120,66 +3189,603 @@
             </a:r>
           </a:p>
           <a:p>
-            <a:endParaRPr lang="en-US" dirty="0">
+            <a:endParaRPr lang="en-US" sz="1400" dirty="0">
+              <a:solidFill>
+                <a:schemeClr val="bg1">
+                  <a:lumMod val="50000"/>
+                </a:schemeClr>
+              </a:solidFill>
               <a:latin typeface="Helvetica"/>
               <a:cs typeface="Helvetica"/>
             </a:endParaRPr>
           </a:p>
           <a:p>
             <a:r>
-              <a:rPr lang="en-US" sz="1600" dirty="0" smtClean="0">
+              <a:rPr lang="en-US" sz="1400" dirty="0" smtClean="0">
+                <a:solidFill>
+                  <a:schemeClr val="bg1">
+                    <a:lumMod val="50000"/>
+                  </a:schemeClr>
+                </a:solidFill>
                 <a:latin typeface="Helvetica"/>
                 <a:cs typeface="Helvetica"/>
               </a:rPr>
               <a:t>Target 2</a:t>
             </a:r>
-          </a:p>
-          <a:p>
-            <a:endParaRPr lang="en-US" dirty="0">
+            <a:endParaRPr lang="en-US" sz="1600" dirty="0">
+              <a:solidFill>
+                <a:schemeClr val="bg1">
+                  <a:lumMod val="50000"/>
+                </a:schemeClr>
+              </a:solidFill>
               <a:latin typeface="Helvetica"/>
               <a:cs typeface="Helvetica"/>
             </a:endParaRPr>
           </a:p>
           <a:p>
-            <a:r>
-              <a:rPr lang="en-US" sz="1600" dirty="0" smtClean="0">
-                <a:latin typeface="Helvetica"/>
-                <a:cs typeface="Helvetica"/>
-              </a:rPr>
-              <a:t>Target -2</a:t>
-            </a:r>
-          </a:p>
-          <a:p>
-            <a:endParaRPr lang="en-US" dirty="0">
+            <a:endParaRPr lang="en-US" sz="1200" dirty="0" smtClean="0">
+              <a:solidFill>
+                <a:schemeClr val="bg1">
+                  <a:lumMod val="50000"/>
+                </a:schemeClr>
+              </a:solidFill>
               <a:latin typeface="Helvetica"/>
               <a:cs typeface="Helvetica"/>
             </a:endParaRPr>
           </a:p>
           <a:p>
             <a:r>
-              <a:rPr lang="en-US" sz="1600" dirty="0" smtClean="0">
+              <a:rPr lang="en-US" sz="1400" dirty="0" smtClean="0">
+                <a:solidFill>
+                  <a:schemeClr val="bg1">
+                    <a:lumMod val="50000"/>
+                  </a:schemeClr>
+                </a:solidFill>
                 <a:latin typeface="Helvetica"/>
                 <a:cs typeface="Helvetica"/>
               </a:rPr>
-              <a:t>Target -6</a:t>
-            </a:r>
-            <a:endParaRPr lang="en-US" sz="1600" dirty="0">
+              <a:t>Target -2</a:t>
+            </a:r>
+          </a:p>
+          <a:p>
+            <a:endParaRPr lang="en-US" sz="1200" dirty="0" smtClean="0">
+              <a:solidFill>
+                <a:schemeClr val="bg1">
+                  <a:lumMod val="50000"/>
+                </a:schemeClr>
+              </a:solidFill>
               <a:latin typeface="Helvetica"/>
               <a:cs typeface="Helvetica"/>
             </a:endParaRPr>
           </a:p>
-        </p:txBody>
-      </p:sp>
+          <a:p>
+            <a:r>
+              <a:rPr lang="en-US" sz="1400" dirty="0" smtClean="0">
+                <a:solidFill>
+                  <a:schemeClr val="bg1">
+                    <a:lumMod val="50000"/>
+                  </a:schemeClr>
+                </a:solidFill>
+                <a:latin typeface="Helvetica"/>
+                <a:cs typeface="Helvetica"/>
+              </a:rPr>
+              <a:t>Target -6</a:t>
+            </a:r>
+            <a:endParaRPr lang="en-US" sz="1400" dirty="0">
+              <a:solidFill>
+                <a:schemeClr val="bg1">
+                  <a:lumMod val="50000"/>
+                </a:schemeClr>
+              </a:solidFill>
+              <a:latin typeface="Helvetica"/>
+              <a:cs typeface="Helvetica"/>
+            </a:endParaRPr>
+          </a:p>
+        </p:txBody>
+      </p:sp>
+      <p:pic>
+        <p:nvPicPr>
+          <p:cNvPr id="12" name="Picture 11"/>
+          <p:cNvPicPr>
+            <a:picLocks noChangeAspect="1"/>
+          </p:cNvPicPr>
+          <p:nvPr/>
+        </p:nvPicPr>
+        <p:blipFill>
+          <a:blip r:embed="rId5">
+            <a:extLst>
+              <a:ext uri="{28A0092B-C50C-407E-A947-70E740481C1C}">
+                <a14:useLocalDpi xmlns:a14="http://schemas.microsoft.com/office/drawing/2010/main" val="0"/>
+              </a:ext>
+            </a:extLst>
+          </a:blip>
+          <a:stretch>
+            <a:fillRect/>
+          </a:stretch>
+        </p:blipFill>
+        <p:spPr>
+          <a:xfrm>
+            <a:off x="3610552" y="3735569"/>
+            <a:ext cx="4163242" cy="3122431"/>
+          </a:xfrm>
+          <a:prstGeom prst="rect">
+            <a:avLst/>
+          </a:prstGeom>
+        </p:spPr>
+      </p:pic>
+      <p:sp>
+        <p:nvSpPr>
+          <p:cNvPr id="13" name="TextBox 12"/>
+          <p:cNvSpPr txBox="1"/>
+          <p:nvPr/>
+        </p:nvSpPr>
+        <p:spPr>
+          <a:xfrm>
+            <a:off x="8830096" y="24591"/>
+            <a:ext cx="2873829" cy="338554"/>
+          </a:xfrm>
+          <a:prstGeom prst="rect">
+            <a:avLst/>
+          </a:prstGeom>
+          <a:noFill/>
+        </p:spPr>
+        <p:txBody>
+          <a:bodyPr wrap="square" rtlCol="0">
+            <a:spAutoFit/>
+          </a:bodyPr>
+          <a:lstStyle/>
+          <a:p>
+            <a:r>
+              <a:rPr lang="en-US" sz="1600" dirty="0" smtClean="0">
+                <a:latin typeface="Arial" panose="020B0604020202020204" pitchFamily="34" charset="0"/>
+                <a:cs typeface="Arial" panose="020B0604020202020204" pitchFamily="34" charset="0"/>
+              </a:rPr>
+              <a:t>Patient 1, Late Learning (</a:t>
+            </a:r>
+            <a:r>
+              <a:rPr lang="en-US" sz="1600" dirty="0" err="1" smtClean="0">
+                <a:latin typeface="Arial" panose="020B0604020202020204" pitchFamily="34" charset="0"/>
+                <a:cs typeface="Arial" panose="020B0604020202020204" pitchFamily="34" charset="0"/>
+              </a:rPr>
+              <a:t>gh</a:t>
+            </a:r>
+            <a:r>
+              <a:rPr lang="en-US" sz="1600" dirty="0" smtClean="0">
+                <a:latin typeface="Arial" panose="020B0604020202020204" pitchFamily="34" charset="0"/>
+                <a:cs typeface="Arial" panose="020B0604020202020204" pitchFamily="34" charset="0"/>
+              </a:rPr>
+              <a:t>)</a:t>
+            </a:r>
+            <a:endParaRPr lang="en-US" sz="1600" dirty="0">
+              <a:latin typeface="Arial" panose="020B0604020202020204" pitchFamily="34" charset="0"/>
+              <a:cs typeface="Arial" panose="020B0604020202020204" pitchFamily="34" charset="0"/>
+            </a:endParaRPr>
+          </a:p>
+        </p:txBody>
+      </p:sp>
+      <p:sp>
+        <p:nvSpPr>
+          <p:cNvPr id="14" name="TextBox 13"/>
+          <p:cNvSpPr txBox="1"/>
+          <p:nvPr/>
+        </p:nvSpPr>
+        <p:spPr>
+          <a:xfrm>
+            <a:off x="8921535" y="3458449"/>
+            <a:ext cx="2782390" cy="338554"/>
+          </a:xfrm>
+          <a:prstGeom prst="rect">
+            <a:avLst/>
+          </a:prstGeom>
+          <a:noFill/>
+        </p:spPr>
+        <p:txBody>
+          <a:bodyPr wrap="square" rtlCol="0">
+            <a:spAutoFit/>
+          </a:bodyPr>
+          <a:lstStyle/>
+          <a:p>
+            <a:r>
+              <a:rPr lang="en-US" sz="1600" dirty="0" smtClean="0">
+                <a:latin typeface="Arial" panose="020B0604020202020204" pitchFamily="34" charset="0"/>
+                <a:cs typeface="Arial" panose="020B0604020202020204" pitchFamily="34" charset="0"/>
+              </a:rPr>
+              <a:t>Patient 2, Late Learning (</a:t>
+            </a:r>
+            <a:r>
+              <a:rPr lang="en-US" sz="1600" dirty="0" err="1" smtClean="0">
+                <a:latin typeface="Arial" panose="020B0604020202020204" pitchFamily="34" charset="0"/>
+                <a:cs typeface="Arial" panose="020B0604020202020204" pitchFamily="34" charset="0"/>
+              </a:rPr>
+              <a:t>i</a:t>
+            </a:r>
+            <a:r>
+              <a:rPr lang="en-US" sz="1600" dirty="0" smtClean="0">
+                <a:latin typeface="Arial" panose="020B0604020202020204" pitchFamily="34" charset="0"/>
+                <a:cs typeface="Arial" panose="020B0604020202020204" pitchFamily="34" charset="0"/>
+              </a:rPr>
+              <a:t>)</a:t>
+            </a:r>
+            <a:endParaRPr lang="en-US" sz="1600" dirty="0">
+              <a:latin typeface="Arial" panose="020B0604020202020204" pitchFamily="34" charset="0"/>
+              <a:cs typeface="Arial" panose="020B0604020202020204" pitchFamily="34" charset="0"/>
+            </a:endParaRPr>
+          </a:p>
+        </p:txBody>
+      </p:sp>
+      <p:sp>
+        <p:nvSpPr>
+          <p:cNvPr id="15" name="TextBox 14"/>
+          <p:cNvSpPr txBox="1"/>
+          <p:nvPr/>
+        </p:nvSpPr>
+        <p:spPr>
+          <a:xfrm>
+            <a:off x="4300978" y="3458449"/>
+            <a:ext cx="3098628" cy="338554"/>
+          </a:xfrm>
+          <a:prstGeom prst="rect">
+            <a:avLst/>
+          </a:prstGeom>
+          <a:noFill/>
+        </p:spPr>
+        <p:txBody>
+          <a:bodyPr wrap="square" rtlCol="0">
+            <a:spAutoFit/>
+          </a:bodyPr>
+          <a:lstStyle/>
+          <a:p>
+            <a:r>
+              <a:rPr lang="en-US" sz="1600" dirty="0" smtClean="0">
+                <a:latin typeface="Arial" panose="020B0604020202020204" pitchFamily="34" charset="0"/>
+                <a:cs typeface="Arial" panose="020B0604020202020204" pitchFamily="34" charset="0"/>
+              </a:rPr>
+              <a:t>Patient 3, Late Learning (</a:t>
+            </a:r>
+            <a:r>
+              <a:rPr lang="en-US" sz="1600" dirty="0" err="1" smtClean="0">
+                <a:latin typeface="Arial" panose="020B0604020202020204" pitchFamily="34" charset="0"/>
+                <a:cs typeface="Arial" panose="020B0604020202020204" pitchFamily="34" charset="0"/>
+              </a:rPr>
+              <a:t>defijk</a:t>
+            </a:r>
+            <a:r>
+              <a:rPr lang="en-US" sz="1600" dirty="0" smtClean="0">
+                <a:latin typeface="Arial" panose="020B0604020202020204" pitchFamily="34" charset="0"/>
+                <a:cs typeface="Arial" panose="020B0604020202020204" pitchFamily="34" charset="0"/>
+              </a:rPr>
+              <a:t>)</a:t>
+            </a:r>
+            <a:endParaRPr lang="en-US" sz="1600" dirty="0">
+              <a:latin typeface="Arial" panose="020B0604020202020204" pitchFamily="34" charset="0"/>
+              <a:cs typeface="Arial" panose="020B0604020202020204" pitchFamily="34" charset="0"/>
+            </a:endParaRPr>
+          </a:p>
+        </p:txBody>
+      </p:sp>
+      <p:sp>
+        <p:nvSpPr>
+          <p:cNvPr id="16" name="TextBox 15"/>
+          <p:cNvSpPr txBox="1"/>
+          <p:nvPr/>
+        </p:nvSpPr>
+        <p:spPr>
+          <a:xfrm>
+            <a:off x="490804" y="662513"/>
+            <a:ext cx="7537954" cy="3200876"/>
+          </a:xfrm>
+          <a:prstGeom prst="rect">
+            <a:avLst/>
+          </a:prstGeom>
+          <a:noFill/>
+        </p:spPr>
+        <p:txBody>
+          <a:bodyPr wrap="square" rtlCol="0">
+            <a:spAutoFit/>
+          </a:bodyPr>
+          <a:lstStyle/>
+          <a:p>
+            <a:r>
+              <a:rPr lang="en-US" dirty="0" smtClean="0">
+                <a:latin typeface="Arial" panose="020B0604020202020204" pitchFamily="34" charset="0"/>
+                <a:cs typeface="Arial" panose="020B0604020202020204" pitchFamily="34" charset="0"/>
+              </a:rPr>
+              <a:t>Starr Lab Collaboration: BMI Learning with </a:t>
+            </a:r>
+            <a:r>
+              <a:rPr lang="en-US" dirty="0" err="1" smtClean="0">
+                <a:latin typeface="Arial" panose="020B0604020202020204" pitchFamily="34" charset="0"/>
+                <a:cs typeface="Arial" panose="020B0604020202020204" pitchFamily="34" charset="0"/>
+              </a:rPr>
+              <a:t>Activa</a:t>
+            </a:r>
+            <a:r>
+              <a:rPr lang="en-US" dirty="0" smtClean="0">
+                <a:latin typeface="Arial" panose="020B0604020202020204" pitchFamily="34" charset="0"/>
+                <a:cs typeface="Arial" panose="020B0604020202020204" pitchFamily="34" charset="0"/>
+              </a:rPr>
+              <a:t> PC + S</a:t>
+            </a:r>
+          </a:p>
+          <a:p>
+            <a:pPr marL="285750" indent="-285750">
+              <a:buFontTx/>
+              <a:buChar char="-"/>
+            </a:pPr>
+            <a:r>
+              <a:rPr lang="en-US" dirty="0" smtClean="0">
+                <a:latin typeface="Arial" panose="020B0604020202020204" pitchFamily="34" charset="0"/>
+                <a:cs typeface="Arial" panose="020B0604020202020204" pitchFamily="34" charset="0"/>
+              </a:rPr>
+              <a:t>Beta band used as input signal in one-dimensional neurofeedback task</a:t>
+            </a:r>
+          </a:p>
+          <a:p>
+            <a:pPr marL="285750" indent="-285750">
+              <a:buFontTx/>
+              <a:buChar char="-"/>
+            </a:pPr>
+            <a:r>
+              <a:rPr lang="en-US" dirty="0" smtClean="0">
+                <a:latin typeface="Arial" panose="020B0604020202020204" pitchFamily="34" charset="0"/>
+                <a:cs typeface="Arial" panose="020B0604020202020204" pitchFamily="34" charset="0"/>
+              </a:rPr>
+              <a:t>3 Patients perform a single 1-2 </a:t>
+            </a:r>
+            <a:r>
+              <a:rPr lang="en-US" dirty="0" err="1" smtClean="0">
+                <a:latin typeface="Arial" panose="020B0604020202020204" pitchFamily="34" charset="0"/>
+                <a:cs typeface="Arial" panose="020B0604020202020204" pitchFamily="34" charset="0"/>
+              </a:rPr>
+              <a:t>hr</a:t>
+            </a:r>
+            <a:r>
+              <a:rPr lang="en-US" dirty="0" smtClean="0">
+                <a:latin typeface="Arial" panose="020B0604020202020204" pitchFamily="34" charset="0"/>
+                <a:cs typeface="Arial" panose="020B0604020202020204" pitchFamily="34" charset="0"/>
+              </a:rPr>
+              <a:t> session each</a:t>
+            </a:r>
+          </a:p>
+          <a:p>
+            <a:pPr marL="285750" indent="-285750">
+              <a:buFontTx/>
+              <a:buChar char="-"/>
+            </a:pPr>
+            <a:r>
+              <a:rPr lang="en-US" dirty="0" smtClean="0">
+                <a:latin typeface="Arial" panose="020B0604020202020204" pitchFamily="34" charset="0"/>
+                <a:cs typeface="Arial" panose="020B0604020202020204" pitchFamily="34" charset="0"/>
+              </a:rPr>
+              <a:t>Decoders initially fit, fixed over session</a:t>
+            </a:r>
+          </a:p>
+          <a:p>
+            <a:pPr marL="285750" indent="-285750">
+              <a:buFontTx/>
+              <a:buChar char="-"/>
+            </a:pPr>
+            <a:r>
+              <a:rPr lang="en-US" dirty="0" smtClean="0">
+                <a:latin typeface="Arial" panose="020B0604020202020204" pitchFamily="34" charset="0"/>
+                <a:cs typeface="Arial" panose="020B0604020202020204" pitchFamily="34" charset="0"/>
+              </a:rPr>
+              <a:t>Each patient shows performance benefit for at least 1 target that is difficult in the beginning and becomes easier (red </a:t>
+            </a:r>
+            <a:r>
+              <a:rPr lang="en-US" dirty="0" smtClean="0">
+                <a:latin typeface="Arial" panose="020B0604020202020204" pitchFamily="34" charset="0"/>
+                <a:cs typeface="Arial" panose="020B0604020202020204" pitchFamily="34" charset="0"/>
+              </a:rPr>
+              <a:t>arrows, note y axis)</a:t>
+            </a:r>
+          </a:p>
+          <a:p>
+            <a:pPr marL="285750" indent="-285750">
+              <a:buFontTx/>
+              <a:buChar char="-"/>
+            </a:pPr>
+            <a:r>
+              <a:rPr lang="en-US" dirty="0" smtClean="0">
+                <a:latin typeface="Arial" panose="020B0604020202020204" pitchFamily="34" charset="0"/>
+                <a:cs typeface="Arial" panose="020B0604020202020204" pitchFamily="34" charset="0"/>
+              </a:rPr>
+              <a:t>Future task: Remove central targets (that subject gets by chance)</a:t>
+            </a:r>
+            <a:endParaRPr lang="en-US" dirty="0" smtClean="0">
+              <a:latin typeface="Arial" panose="020B0604020202020204" pitchFamily="34" charset="0"/>
+              <a:cs typeface="Arial" panose="020B0604020202020204" pitchFamily="34" charset="0"/>
+            </a:endParaRPr>
+          </a:p>
+          <a:p>
+            <a:pPr marL="285750" indent="-285750">
+              <a:buFontTx/>
+              <a:buChar char="-"/>
+            </a:pPr>
+            <a:endParaRPr lang="en-US" dirty="0" smtClean="0">
+              <a:latin typeface="Arial" panose="020B0604020202020204" pitchFamily="34" charset="0"/>
+              <a:cs typeface="Arial" panose="020B0604020202020204" pitchFamily="34" charset="0"/>
+            </a:endParaRPr>
+          </a:p>
+          <a:p>
+            <a:endParaRPr lang="en-US" sz="2000" dirty="0" smtClean="0">
+              <a:latin typeface="Arial" panose="020B0604020202020204" pitchFamily="34" charset="0"/>
+              <a:cs typeface="Arial" panose="020B0604020202020204" pitchFamily="34" charset="0"/>
+            </a:endParaRPr>
+          </a:p>
+          <a:p>
+            <a:pPr marL="285750" indent="-285750">
+              <a:buFontTx/>
+              <a:buChar char="-"/>
+            </a:pPr>
+            <a:endParaRPr lang="en-US" sz="2000" dirty="0">
+              <a:latin typeface="Arial" panose="020B0604020202020204" pitchFamily="34" charset="0"/>
+              <a:cs typeface="Arial" panose="020B0604020202020204" pitchFamily="34" charset="0"/>
+            </a:endParaRPr>
+          </a:p>
+        </p:txBody>
+      </p:sp>
+      <p:cxnSp>
+        <p:nvCxnSpPr>
+          <p:cNvPr id="22" name="Straight Arrow Connector 21"/>
+          <p:cNvCxnSpPr/>
+          <p:nvPr/>
+        </p:nvCxnSpPr>
+        <p:spPr>
+          <a:xfrm flipH="1">
+            <a:off x="11577251" y="5462618"/>
+            <a:ext cx="464694" cy="326781"/>
+          </a:xfrm>
+          <a:prstGeom prst="straightConnector1">
+            <a:avLst/>
+          </a:prstGeom>
+          <a:ln w="44450">
+            <a:solidFill>
+              <a:srgbClr val="FF0000"/>
+            </a:solidFill>
+            <a:tailEnd type="triangle"/>
+          </a:ln>
+        </p:spPr>
+        <p:style>
+          <a:lnRef idx="1">
+            <a:schemeClr val="accent1"/>
+          </a:lnRef>
+          <a:fillRef idx="0">
+            <a:schemeClr val="accent1"/>
+          </a:fillRef>
+          <a:effectRef idx="0">
+            <a:schemeClr val="accent1"/>
+          </a:effectRef>
+          <a:fontRef idx="minor">
+            <a:schemeClr val="tx1"/>
+          </a:fontRef>
+        </p:style>
+      </p:cxnSp>
+      <p:cxnSp>
+        <p:nvCxnSpPr>
+          <p:cNvPr id="25" name="Straight Arrow Connector 24"/>
+          <p:cNvCxnSpPr/>
+          <p:nvPr/>
+        </p:nvCxnSpPr>
+        <p:spPr>
+          <a:xfrm flipH="1">
+            <a:off x="7167259" y="3946061"/>
+            <a:ext cx="464694" cy="326781"/>
+          </a:xfrm>
+          <a:prstGeom prst="straightConnector1">
+            <a:avLst/>
+          </a:prstGeom>
+          <a:ln w="44450">
+            <a:solidFill>
+              <a:srgbClr val="FF0000"/>
+            </a:solidFill>
+            <a:tailEnd type="triangle"/>
+          </a:ln>
+        </p:spPr>
+        <p:style>
+          <a:lnRef idx="1">
+            <a:schemeClr val="accent1"/>
+          </a:lnRef>
+          <a:fillRef idx="0">
+            <a:schemeClr val="accent1"/>
+          </a:fillRef>
+          <a:effectRef idx="0">
+            <a:schemeClr val="accent1"/>
+          </a:effectRef>
+          <a:fontRef idx="minor">
+            <a:schemeClr val="tx1"/>
+          </a:fontRef>
+        </p:style>
+      </p:cxnSp>
+      <p:cxnSp>
+        <p:nvCxnSpPr>
+          <p:cNvPr id="26" name="Straight Arrow Connector 25"/>
+          <p:cNvCxnSpPr/>
+          <p:nvPr/>
+        </p:nvCxnSpPr>
+        <p:spPr>
+          <a:xfrm flipH="1">
+            <a:off x="11577251" y="2168601"/>
+            <a:ext cx="464694" cy="326781"/>
+          </a:xfrm>
+          <a:prstGeom prst="straightConnector1">
+            <a:avLst/>
+          </a:prstGeom>
+          <a:ln w="44450">
+            <a:solidFill>
+              <a:srgbClr val="FF0000"/>
+            </a:solidFill>
+            <a:tailEnd type="triangle"/>
+          </a:ln>
+        </p:spPr>
+        <p:style>
+          <a:lnRef idx="1">
+            <a:schemeClr val="accent1"/>
+          </a:lnRef>
+          <a:fillRef idx="0">
+            <a:schemeClr val="accent1"/>
+          </a:fillRef>
+          <a:effectRef idx="0">
+            <a:schemeClr val="accent1"/>
+          </a:effectRef>
+          <a:fontRef idx="minor">
+            <a:schemeClr val="tx1"/>
+          </a:fontRef>
+        </p:style>
+      </p:cxnSp>
+      <p:cxnSp>
+        <p:nvCxnSpPr>
+          <p:cNvPr id="27" name="Straight Arrow Connector 26"/>
+          <p:cNvCxnSpPr/>
+          <p:nvPr/>
+        </p:nvCxnSpPr>
+        <p:spPr>
+          <a:xfrm flipH="1">
+            <a:off x="9533082" y="622575"/>
+            <a:ext cx="464694" cy="326781"/>
+          </a:xfrm>
+          <a:prstGeom prst="straightConnector1">
+            <a:avLst/>
+          </a:prstGeom>
+          <a:ln w="44450">
+            <a:solidFill>
+              <a:srgbClr val="FF0000"/>
+            </a:solidFill>
+            <a:tailEnd type="triangle"/>
+          </a:ln>
+        </p:spPr>
+        <p:style>
+          <a:lnRef idx="1">
+            <a:schemeClr val="accent1"/>
+          </a:lnRef>
+          <a:fillRef idx="0">
+            <a:schemeClr val="accent1"/>
+          </a:fillRef>
+          <a:effectRef idx="0">
+            <a:schemeClr val="accent1"/>
+          </a:effectRef>
+          <a:fontRef idx="minor">
+            <a:schemeClr val="tx1"/>
+          </a:fontRef>
+        </p:style>
+      </p:cxnSp>
     </p:spTree>
     <p:extLst>
       <p:ext uri="{BB962C8B-B14F-4D97-AF65-F5344CB8AC3E}">
-        <p14:creationId xmlns:p14="http://schemas.microsoft.com/office/powerpoint/2010/main" val="755519926"/>
+        <p14:creationId xmlns:p14="http://schemas.microsoft.com/office/powerpoint/2010/main" val="3701378910"/>
       </p:ext>
     </p:extLst>
   </p:cSld>
   <p:clrMapOvr>
     <a:masterClrMapping/>
   </p:clrMapOvr>
+  <p:timing>
+    <p:tnLst>
+      <p:par>
+        <p:cTn id="1" dur="indefinite" restart="never" nodeType="tmRoot"/>
+      </p:par>
+    </p:tnLst>
+  </p:timing>
 </p:sld>
 </file>
 
@@ -3209,15 +3815,21 @@
           <p:nvPr/>
         </p:nvPicPr>
         <p:blipFill>
-          <a:blip r:embed="rId2"/>
+          <a:blip r:embed="rId2">
+            <a:extLst>
+              <a:ext uri="{28A0092B-C50C-407E-A947-70E740481C1C}">
+                <a14:useLocalDpi xmlns:a14="http://schemas.microsoft.com/office/drawing/2010/main" val="0"/>
+              </a:ext>
+            </a:extLst>
+          </a:blip>
           <a:stretch>
             <a:fillRect/>
           </a:stretch>
         </p:blipFill>
         <p:spPr>
           <a:xfrm>
-            <a:off x="1962244" y="1127267"/>
-            <a:ext cx="7721600" cy="5613400"/>
+            <a:off x="6552972" y="480938"/>
+            <a:ext cx="5598830" cy="4199123"/>
           </a:xfrm>
           <a:prstGeom prst="rect">
             <a:avLst/>
@@ -3232,8 +3844,8 @@
         </p:nvSpPr>
         <p:spPr>
           <a:xfrm>
-            <a:off x="5823044" y="436728"/>
-            <a:ext cx="1018677" cy="369332"/>
+            <a:off x="464234" y="354327"/>
+            <a:ext cx="6292721" cy="3139321"/>
           </a:xfrm>
           <a:prstGeom prst="rect">
             <a:avLst/>
@@ -3241,83 +3853,572 @@
           <a:noFill/>
         </p:spPr>
         <p:txBody>
-          <a:bodyPr wrap="none" rtlCol="0">
+          <a:bodyPr wrap="square" rtlCol="0">
             <a:spAutoFit/>
           </a:bodyPr>
           <a:lstStyle/>
           <a:p>
             <a:r>
-              <a:rPr lang="en-US" dirty="0" smtClean="0"/>
-              <a:t>Patient 2</a:t>
-            </a:r>
-            <a:endParaRPr lang="en-US" dirty="0"/>
+              <a:rPr lang="en-US" b="1" dirty="0" smtClean="0">
+                <a:latin typeface="Arial" panose="020B0604020202020204" pitchFamily="34" charset="0"/>
+                <a:cs typeface="Arial" panose="020B0604020202020204" pitchFamily="34" charset="0"/>
+              </a:rPr>
+              <a:t>At-home BMI training: </a:t>
+            </a:r>
+          </a:p>
+          <a:p>
+            <a:pPr marL="285750" indent="-285750">
+              <a:buFont typeface="Arial" panose="020B0604020202020204" pitchFamily="34" charset="0"/>
+              <a:buChar char="•"/>
+            </a:pPr>
+            <a:r>
+              <a:rPr lang="en-US" dirty="0" smtClean="0">
+                <a:latin typeface="Arial" panose="020B0604020202020204" pitchFamily="34" charset="0"/>
+                <a:cs typeface="Arial" panose="020B0604020202020204" pitchFamily="34" charset="0"/>
+              </a:rPr>
+              <a:t>Currently considering patients 1 and 3</a:t>
+            </a:r>
+          </a:p>
+          <a:p>
+            <a:pPr marL="742950" lvl="1" indent="-285750">
+              <a:buFont typeface="Arial" panose="020B0604020202020204" pitchFamily="34" charset="0"/>
+              <a:buChar char="•"/>
+            </a:pPr>
+            <a:r>
+              <a:rPr lang="en-US" dirty="0" smtClean="0">
+                <a:latin typeface="Arial" panose="020B0604020202020204" pitchFamily="34" charset="0"/>
+                <a:cs typeface="Arial" panose="020B0604020202020204" pitchFamily="34" charset="0"/>
+              </a:rPr>
+              <a:t>Patient </a:t>
+            </a:r>
+            <a:r>
+              <a:rPr lang="en-US" dirty="0">
+                <a:latin typeface="Arial" panose="020B0604020202020204" pitchFamily="34" charset="0"/>
+                <a:cs typeface="Arial" panose="020B0604020202020204" pitchFamily="34" charset="0"/>
+              </a:rPr>
+              <a:t>1 shows strongest beta band peak (red) </a:t>
+            </a:r>
+            <a:endParaRPr lang="en-US" dirty="0" smtClean="0">
+              <a:latin typeface="Arial" panose="020B0604020202020204" pitchFamily="34" charset="0"/>
+              <a:cs typeface="Arial" panose="020B0604020202020204" pitchFamily="34" charset="0"/>
+            </a:endParaRPr>
+          </a:p>
+          <a:p>
+            <a:pPr marL="742950" lvl="1" indent="-285750">
+              <a:buFont typeface="Arial" panose="020B0604020202020204" pitchFamily="34" charset="0"/>
+              <a:buChar char="•"/>
+            </a:pPr>
+            <a:r>
+              <a:rPr lang="en-US" dirty="0">
+                <a:latin typeface="Arial" panose="020B0604020202020204" pitchFamily="34" charset="0"/>
+                <a:cs typeface="Arial" panose="020B0604020202020204" pitchFamily="34" charset="0"/>
+              </a:rPr>
+              <a:t>P</a:t>
+            </a:r>
+            <a:r>
+              <a:rPr lang="en-US" dirty="0" smtClean="0">
+                <a:latin typeface="Arial" panose="020B0604020202020204" pitchFamily="34" charset="0"/>
+                <a:cs typeface="Arial" panose="020B0604020202020204" pitchFamily="34" charset="0"/>
+              </a:rPr>
+              <a:t>atient </a:t>
+            </a:r>
+            <a:r>
+              <a:rPr lang="en-US" dirty="0">
+                <a:latin typeface="Arial" panose="020B0604020202020204" pitchFamily="34" charset="0"/>
+                <a:cs typeface="Arial" panose="020B0604020202020204" pitchFamily="34" charset="0"/>
+              </a:rPr>
+              <a:t>3 shows considerably higher noise in signal (purple) </a:t>
+            </a:r>
+            <a:r>
+              <a:rPr lang="en-US" dirty="0" smtClean="0">
+                <a:latin typeface="Arial" panose="020B0604020202020204" pitchFamily="34" charset="0"/>
+                <a:cs typeface="Arial" panose="020B0604020202020204" pitchFamily="34" charset="0"/>
+              </a:rPr>
+              <a:t>making it possible that difficulty in improved performance is due to noise contamination of beta signal</a:t>
+            </a:r>
+            <a:endParaRPr lang="en-US" dirty="0" smtClean="0">
+              <a:latin typeface="Arial" panose="020B0604020202020204" pitchFamily="34" charset="0"/>
+              <a:cs typeface="Arial" panose="020B0604020202020204" pitchFamily="34" charset="0"/>
+            </a:endParaRPr>
+          </a:p>
+          <a:p>
+            <a:pPr marL="285750" indent="-285750">
+              <a:buFont typeface="Arial" panose="020B0604020202020204" pitchFamily="34" charset="0"/>
+              <a:buChar char="•"/>
+            </a:pPr>
+            <a:r>
+              <a:rPr lang="en-US" dirty="0" smtClean="0">
+                <a:latin typeface="Arial" panose="020B0604020202020204" pitchFamily="34" charset="0"/>
+                <a:cs typeface="Arial" panose="020B0604020202020204" pitchFamily="34" charset="0"/>
+              </a:rPr>
+              <a:t>IRB</a:t>
+            </a:r>
+            <a:r>
+              <a:rPr lang="en-US" dirty="0">
+                <a:latin typeface="Arial" panose="020B0604020202020204" pitchFamily="34" charset="0"/>
+                <a:cs typeface="Arial" panose="020B0604020202020204" pitchFamily="34" charset="0"/>
+              </a:rPr>
+              <a:t> </a:t>
+            </a:r>
+            <a:r>
+              <a:rPr lang="en-US" dirty="0" smtClean="0">
+                <a:latin typeface="Arial" panose="020B0604020202020204" pitchFamily="34" charset="0"/>
+                <a:cs typeface="Arial" panose="020B0604020202020204" pitchFamily="34" charset="0"/>
+              </a:rPr>
+              <a:t>for at-home BMI was </a:t>
+            </a:r>
+            <a:r>
+              <a:rPr lang="en-US" dirty="0">
+                <a:latin typeface="Arial" panose="020B0604020202020204" pitchFamily="34" charset="0"/>
+                <a:cs typeface="Arial" panose="020B0604020202020204" pitchFamily="34" charset="0"/>
+              </a:rPr>
+              <a:t>approved and a follow up FDA letter was </a:t>
+            </a:r>
+            <a:r>
+              <a:rPr lang="en-US" dirty="0" smtClean="0">
+                <a:latin typeface="Arial" panose="020B0604020202020204" pitchFamily="34" charset="0"/>
+                <a:cs typeface="Arial" panose="020B0604020202020204" pitchFamily="34" charset="0"/>
+              </a:rPr>
+              <a:t>sent </a:t>
+            </a:r>
+            <a:r>
+              <a:rPr lang="en-US" dirty="0">
+                <a:latin typeface="Arial" panose="020B0604020202020204" pitchFamily="34" charset="0"/>
+                <a:cs typeface="Arial" panose="020B0604020202020204" pitchFamily="34" charset="0"/>
+              </a:rPr>
+              <a:t>to inform them of the new </a:t>
+            </a:r>
+            <a:r>
+              <a:rPr lang="en-US" dirty="0" smtClean="0">
+                <a:latin typeface="Arial" panose="020B0604020202020204" pitchFamily="34" charset="0"/>
+                <a:cs typeface="Arial" panose="020B0604020202020204" pitchFamily="34" charset="0"/>
+              </a:rPr>
+              <a:t>protocol (early Sept)</a:t>
+            </a:r>
+          </a:p>
+          <a:p>
+            <a:pPr marL="285750" indent="-285750">
+              <a:buFont typeface="Arial" panose="020B0604020202020204" pitchFamily="34" charset="0"/>
+              <a:buChar char="•"/>
+            </a:pPr>
+            <a:r>
+              <a:rPr lang="en-US" dirty="0" smtClean="0">
+                <a:latin typeface="Arial" panose="020B0604020202020204" pitchFamily="34" charset="0"/>
+                <a:cs typeface="Arial" panose="020B0604020202020204" pitchFamily="34" charset="0"/>
+              </a:rPr>
+              <a:t>No changes needed to actual Starr lab </a:t>
+            </a:r>
+            <a:r>
+              <a:rPr lang="en-US" dirty="0">
+                <a:latin typeface="Arial" panose="020B0604020202020204" pitchFamily="34" charset="0"/>
+                <a:cs typeface="Arial" panose="020B0604020202020204" pitchFamily="34" charset="0"/>
+              </a:rPr>
+              <a:t>FDA </a:t>
+            </a:r>
+            <a:r>
+              <a:rPr lang="en-US" dirty="0" smtClean="0">
+                <a:latin typeface="Arial" panose="020B0604020202020204" pitchFamily="34" charset="0"/>
+                <a:cs typeface="Arial" panose="020B0604020202020204" pitchFamily="34" charset="0"/>
+              </a:rPr>
+              <a:t>submission</a:t>
+            </a:r>
+          </a:p>
+        </p:txBody>
+      </p:sp>
+      <p:sp>
+        <p:nvSpPr>
+          <p:cNvPr id="6" name="TextBox 5"/>
+          <p:cNvSpPr txBox="1"/>
+          <p:nvPr/>
+        </p:nvSpPr>
+        <p:spPr>
+          <a:xfrm>
+            <a:off x="7351258" y="296272"/>
+            <a:ext cx="4178105" cy="369332"/>
+          </a:xfrm>
+          <a:prstGeom prst="rect">
+            <a:avLst/>
+          </a:prstGeom>
+          <a:noFill/>
+        </p:spPr>
+        <p:txBody>
+          <a:bodyPr wrap="square" rtlCol="0">
+            <a:spAutoFit/>
+          </a:bodyPr>
+          <a:lstStyle/>
+          <a:p>
+            <a:r>
+              <a:rPr lang="en-US" dirty="0" smtClean="0">
+                <a:latin typeface="Arial" panose="020B0604020202020204" pitchFamily="34" charset="0"/>
+                <a:cs typeface="Arial" panose="020B0604020202020204" pitchFamily="34" charset="0"/>
+              </a:rPr>
+              <a:t>Power Spectral Density of Patients 1-3</a:t>
+            </a:r>
+            <a:endParaRPr lang="en-US" dirty="0">
+              <a:latin typeface="Arial" panose="020B0604020202020204" pitchFamily="34" charset="0"/>
+              <a:cs typeface="Arial" panose="020B0604020202020204" pitchFamily="34" charset="0"/>
+            </a:endParaRPr>
+          </a:p>
+        </p:txBody>
+      </p:sp>
+      <p:sp>
+        <p:nvSpPr>
+          <p:cNvPr id="7" name="Rectangle 6"/>
+          <p:cNvSpPr/>
+          <p:nvPr/>
+        </p:nvSpPr>
+        <p:spPr>
+          <a:xfrm>
+            <a:off x="310383" y="3271857"/>
+            <a:ext cx="11855491" cy="3693319"/>
+          </a:xfrm>
+          <a:prstGeom prst="rect">
+            <a:avLst/>
+          </a:prstGeom>
+        </p:spPr>
+        <p:txBody>
+          <a:bodyPr wrap="square">
+            <a:spAutoFit/>
+          </a:bodyPr>
+          <a:lstStyle/>
+          <a:p>
+            <a:pPr marL="285750" indent="-285750">
+              <a:buFont typeface="Arial" panose="020B0604020202020204" pitchFamily="34" charset="0"/>
+              <a:buChar char="•"/>
+            </a:pPr>
+            <a:endParaRPr lang="en-US" dirty="0">
+              <a:latin typeface="Arial" panose="020B0604020202020204" pitchFamily="34" charset="0"/>
+              <a:cs typeface="Arial" panose="020B0604020202020204" pitchFamily="34" charset="0"/>
+            </a:endParaRPr>
+          </a:p>
+          <a:p>
+            <a:r>
+              <a:rPr lang="en-US" dirty="0">
+                <a:latin typeface="Arial" panose="020B0604020202020204" pitchFamily="34" charset="0"/>
+                <a:cs typeface="Arial" panose="020B0604020202020204" pitchFamily="34" charset="0"/>
+              </a:rPr>
+              <a:t>In-clinic </a:t>
+            </a:r>
+            <a:r>
+              <a:rPr lang="en-US" dirty="0" smtClean="0">
+                <a:latin typeface="Arial" panose="020B0604020202020204" pitchFamily="34" charset="0"/>
+                <a:cs typeface="Arial" panose="020B0604020202020204" pitchFamily="34" charset="0"/>
+              </a:rPr>
+              <a:t>neural control </a:t>
+            </a:r>
+            <a:r>
+              <a:rPr lang="en-US" dirty="0">
+                <a:latin typeface="Arial" panose="020B0604020202020204" pitchFamily="34" charset="0"/>
+                <a:cs typeface="Arial" panose="020B0604020202020204" pitchFamily="34" charset="0"/>
+              </a:rPr>
+              <a:t>signals used were all beta band </a:t>
+            </a:r>
+            <a:endParaRPr lang="en-US" dirty="0" smtClean="0">
+              <a:latin typeface="Arial" panose="020B0604020202020204" pitchFamily="34" charset="0"/>
+              <a:cs typeface="Arial" panose="020B0604020202020204" pitchFamily="34" charset="0"/>
+            </a:endParaRPr>
+          </a:p>
+          <a:p>
+            <a:r>
+              <a:rPr lang="en-US" dirty="0" smtClean="0">
+                <a:latin typeface="Arial" panose="020B0604020202020204" pitchFamily="34" charset="0"/>
+                <a:cs typeface="Arial" panose="020B0604020202020204" pitchFamily="34" charset="0"/>
+              </a:rPr>
+              <a:t>frequency </a:t>
+            </a:r>
+            <a:r>
+              <a:rPr lang="en-US" dirty="0">
+                <a:latin typeface="Arial" panose="020B0604020202020204" pitchFamily="34" charset="0"/>
+                <a:cs typeface="Arial" panose="020B0604020202020204" pitchFamily="34" charset="0"/>
+              </a:rPr>
+              <a:t>range </a:t>
+            </a:r>
+            <a:r>
+              <a:rPr lang="en-US" dirty="0" smtClean="0">
+                <a:latin typeface="Arial" panose="020B0604020202020204" pitchFamily="34" charset="0"/>
+                <a:cs typeface="Arial" panose="020B0604020202020204" pitchFamily="34" charset="0"/>
+              </a:rPr>
+              <a:t>but </a:t>
+            </a:r>
+            <a:r>
+              <a:rPr lang="en-US" dirty="0">
+                <a:latin typeface="Arial" panose="020B0604020202020204" pitchFamily="34" charset="0"/>
+                <a:cs typeface="Arial" panose="020B0604020202020204" pitchFamily="34" charset="0"/>
+              </a:rPr>
+              <a:t>processing was different for different </a:t>
+            </a:r>
+            <a:endParaRPr lang="en-US" dirty="0" smtClean="0">
+              <a:latin typeface="Arial" panose="020B0604020202020204" pitchFamily="34" charset="0"/>
+              <a:cs typeface="Arial" panose="020B0604020202020204" pitchFamily="34" charset="0"/>
+            </a:endParaRPr>
+          </a:p>
+          <a:p>
+            <a:r>
+              <a:rPr lang="en-US" dirty="0" smtClean="0">
+                <a:latin typeface="Arial" panose="020B0604020202020204" pitchFamily="34" charset="0"/>
+                <a:cs typeface="Arial" panose="020B0604020202020204" pitchFamily="34" charset="0"/>
+              </a:rPr>
+              <a:t>patients</a:t>
+            </a:r>
+            <a:r>
+              <a:rPr lang="en-US" dirty="0">
+                <a:latin typeface="Arial" panose="020B0604020202020204" pitchFamily="34" charset="0"/>
+                <a:cs typeface="Arial" panose="020B0604020202020204" pitchFamily="34" charset="0"/>
+              </a:rPr>
+              <a:t>: </a:t>
+            </a:r>
+          </a:p>
+          <a:p>
+            <a:pPr marL="285750" indent="-285750">
+              <a:buFont typeface="Arial" panose="020B0604020202020204" pitchFamily="34" charset="0"/>
+              <a:buChar char="•"/>
+            </a:pPr>
+            <a:r>
+              <a:rPr lang="en-US" dirty="0">
+                <a:latin typeface="Arial" panose="020B0604020202020204" pitchFamily="34" charset="0"/>
+                <a:cs typeface="Arial" panose="020B0604020202020204" pitchFamily="34" charset="0"/>
+              </a:rPr>
+              <a:t>Patient 1: Stim off, </a:t>
+            </a:r>
+            <a:r>
+              <a:rPr lang="en-US" dirty="0" smtClean="0">
+                <a:latin typeface="Arial" panose="020B0604020202020204" pitchFamily="34" charset="0"/>
+                <a:cs typeface="Arial" panose="020B0604020202020204" pitchFamily="34" charset="0"/>
+              </a:rPr>
+              <a:t>stream time-domain </a:t>
+            </a:r>
+            <a:r>
+              <a:rPr lang="en-US" dirty="0">
+                <a:latin typeface="Arial" panose="020B0604020202020204" pitchFamily="34" charset="0"/>
+                <a:cs typeface="Arial" panose="020B0604020202020204" pitchFamily="34" charset="0"/>
+              </a:rPr>
+              <a:t>signal, calculate </a:t>
+            </a:r>
+            <a:endParaRPr lang="en-US" dirty="0" smtClean="0">
+              <a:latin typeface="Arial" panose="020B0604020202020204" pitchFamily="34" charset="0"/>
+              <a:cs typeface="Arial" panose="020B0604020202020204" pitchFamily="34" charset="0"/>
+            </a:endParaRPr>
+          </a:p>
+          <a:p>
+            <a:r>
+              <a:rPr lang="en-US" dirty="0">
+                <a:latin typeface="Arial" panose="020B0604020202020204" pitchFamily="34" charset="0"/>
+                <a:cs typeface="Arial" panose="020B0604020202020204" pitchFamily="34" charset="0"/>
+              </a:rPr>
+              <a:t> </a:t>
+            </a:r>
+            <a:r>
+              <a:rPr lang="en-US" dirty="0" smtClean="0">
+                <a:latin typeface="Arial" panose="020B0604020202020204" pitchFamily="34" charset="0"/>
+                <a:cs typeface="Arial" panose="020B0604020202020204" pitchFamily="34" charset="0"/>
+              </a:rPr>
+              <a:t>    beta </a:t>
+            </a:r>
+            <a:r>
+              <a:rPr lang="en-US" dirty="0">
+                <a:latin typeface="Arial" panose="020B0604020202020204" pitchFamily="34" charset="0"/>
+                <a:cs typeface="Arial" panose="020B0604020202020204" pitchFamily="34" charset="0"/>
+              </a:rPr>
+              <a:t>power </a:t>
+            </a:r>
+            <a:r>
+              <a:rPr lang="en-US" dirty="0" smtClean="0">
+                <a:latin typeface="Arial" panose="020B0604020202020204" pitchFamily="34" charset="0"/>
+                <a:cs typeface="Arial" panose="020B0604020202020204" pitchFamily="34" charset="0"/>
+              </a:rPr>
+              <a:t>with </a:t>
+            </a:r>
+            <a:r>
+              <a:rPr lang="en-US" dirty="0">
+                <a:latin typeface="Arial" panose="020B0604020202020204" pitchFamily="34" charset="0"/>
+                <a:cs typeface="Arial" panose="020B0604020202020204" pitchFamily="34" charset="0"/>
+              </a:rPr>
+              <a:t>MT </a:t>
+            </a:r>
+            <a:r>
+              <a:rPr lang="en-US" dirty="0" smtClean="0">
+                <a:latin typeface="Arial" panose="020B0604020202020204" pitchFamily="34" charset="0"/>
+                <a:cs typeface="Arial" panose="020B0604020202020204" pitchFamily="34" charset="0"/>
+              </a:rPr>
+              <a:t>method</a:t>
+            </a:r>
+            <a:endParaRPr lang="en-US" dirty="0">
+              <a:latin typeface="Arial" panose="020B0604020202020204" pitchFamily="34" charset="0"/>
+              <a:cs typeface="Arial" panose="020B0604020202020204" pitchFamily="34" charset="0"/>
+            </a:endParaRPr>
+          </a:p>
+          <a:p>
+            <a:pPr marL="285750" indent="-285750">
+              <a:buFont typeface="Arial" panose="020B0604020202020204" pitchFamily="34" charset="0"/>
+              <a:buChar char="•"/>
+            </a:pPr>
+            <a:r>
+              <a:rPr lang="en-US" dirty="0">
+                <a:latin typeface="Arial" panose="020B0604020202020204" pitchFamily="34" charset="0"/>
+                <a:cs typeface="Arial" panose="020B0604020202020204" pitchFamily="34" charset="0"/>
+              </a:rPr>
+              <a:t>Patient 2: Stim on, </a:t>
+            </a:r>
+            <a:r>
+              <a:rPr lang="en-US" dirty="0" smtClean="0">
+                <a:latin typeface="Arial" panose="020B0604020202020204" pitchFamily="34" charset="0"/>
+                <a:cs typeface="Arial" panose="020B0604020202020204" pitchFamily="34" charset="0"/>
+              </a:rPr>
+              <a:t>stream frequency-domain </a:t>
+            </a:r>
+            <a:r>
+              <a:rPr lang="en-US" dirty="0">
+                <a:latin typeface="Arial" panose="020B0604020202020204" pitchFamily="34" charset="0"/>
+                <a:cs typeface="Arial" panose="020B0604020202020204" pitchFamily="34" charset="0"/>
+              </a:rPr>
+              <a:t>signal centered at beta </a:t>
+            </a:r>
+            <a:r>
+              <a:rPr lang="en-US" dirty="0" smtClean="0">
+                <a:latin typeface="Arial" panose="020B0604020202020204" pitchFamily="34" charset="0"/>
+                <a:cs typeface="Arial" panose="020B0604020202020204" pitchFamily="34" charset="0"/>
+              </a:rPr>
+              <a:t>frequencies</a:t>
+            </a:r>
+            <a:endParaRPr lang="en-US" dirty="0">
+              <a:latin typeface="Arial" panose="020B0604020202020204" pitchFamily="34" charset="0"/>
+              <a:cs typeface="Arial" panose="020B0604020202020204" pitchFamily="34" charset="0"/>
+            </a:endParaRPr>
+          </a:p>
+          <a:p>
+            <a:pPr marL="285750" indent="-285750">
+              <a:buFont typeface="Arial" panose="020B0604020202020204" pitchFamily="34" charset="0"/>
+              <a:buChar char="•"/>
+            </a:pPr>
+            <a:r>
+              <a:rPr lang="en-US" dirty="0">
+                <a:latin typeface="Arial" panose="020B0604020202020204" pitchFamily="34" charset="0"/>
+                <a:cs typeface="Arial" panose="020B0604020202020204" pitchFamily="34" charset="0"/>
+              </a:rPr>
+              <a:t>Patient 3: Stim on, </a:t>
+            </a:r>
+            <a:r>
+              <a:rPr lang="en-US" dirty="0" smtClean="0">
+                <a:latin typeface="Arial" panose="020B0604020202020204" pitchFamily="34" charset="0"/>
+                <a:cs typeface="Arial" panose="020B0604020202020204" pitchFamily="34" charset="0"/>
+              </a:rPr>
+              <a:t>stream time-domain </a:t>
+            </a:r>
+            <a:r>
+              <a:rPr lang="en-US" dirty="0">
+                <a:latin typeface="Arial" panose="020B0604020202020204" pitchFamily="34" charset="0"/>
+                <a:cs typeface="Arial" panose="020B0604020202020204" pitchFamily="34" charset="0"/>
+              </a:rPr>
+              <a:t>signal, calculate beta power with </a:t>
+            </a:r>
+            <a:r>
+              <a:rPr lang="en-US" dirty="0" err="1">
+                <a:latin typeface="Arial" panose="020B0604020202020204" pitchFamily="34" charset="0"/>
+                <a:cs typeface="Arial" panose="020B0604020202020204" pitchFamily="34" charset="0"/>
+              </a:rPr>
+              <a:t>pwelch</a:t>
+            </a:r>
+            <a:r>
+              <a:rPr lang="en-US" dirty="0">
+                <a:latin typeface="Arial" panose="020B0604020202020204" pitchFamily="34" charset="0"/>
+                <a:cs typeface="Arial" panose="020B0604020202020204" pitchFamily="34" charset="0"/>
+              </a:rPr>
+              <a:t> method and use </a:t>
+            </a:r>
+            <a:r>
+              <a:rPr lang="en-US" dirty="0" err="1">
+                <a:latin typeface="Arial" panose="020B0604020202020204" pitchFamily="34" charset="0"/>
+                <a:cs typeface="Arial" panose="020B0604020202020204" pitchFamily="34" charset="0"/>
+              </a:rPr>
+              <a:t>Kalman</a:t>
+            </a:r>
+            <a:r>
+              <a:rPr lang="en-US" dirty="0">
+                <a:latin typeface="Arial" panose="020B0604020202020204" pitchFamily="34" charset="0"/>
+                <a:cs typeface="Arial" panose="020B0604020202020204" pitchFamily="34" charset="0"/>
+              </a:rPr>
+              <a:t> filter for cursor control instead of deterministic linear weighting</a:t>
+            </a:r>
+          </a:p>
+          <a:p>
+            <a:pPr marL="285750" indent="-285750">
+              <a:buFont typeface="Arial" panose="020B0604020202020204" pitchFamily="34" charset="0"/>
+              <a:buChar char="•"/>
+            </a:pPr>
+            <a:endParaRPr lang="en-US" dirty="0">
+              <a:latin typeface="Arial" panose="020B0604020202020204" pitchFamily="34" charset="0"/>
+              <a:cs typeface="Arial" panose="020B0604020202020204" pitchFamily="34" charset="0"/>
+            </a:endParaRPr>
+          </a:p>
+          <a:p>
+            <a:r>
+              <a:rPr lang="en-US" b="1" dirty="0">
+                <a:latin typeface="Arial" panose="020B0604020202020204" pitchFamily="34" charset="0"/>
+                <a:cs typeface="Arial" panose="020B0604020202020204" pitchFamily="34" charset="0"/>
+              </a:rPr>
+              <a:t>Conclusion for long term (at-home) training</a:t>
+            </a:r>
+            <a:r>
+              <a:rPr lang="en-US" dirty="0">
+                <a:latin typeface="Arial" panose="020B0604020202020204" pitchFamily="34" charset="0"/>
+                <a:cs typeface="Arial" panose="020B0604020202020204" pitchFamily="34" charset="0"/>
+              </a:rPr>
+              <a:t>: </a:t>
+            </a:r>
+            <a:r>
+              <a:rPr lang="en-US" dirty="0" err="1">
+                <a:latin typeface="Arial" panose="020B0604020202020204" pitchFamily="34" charset="0"/>
+                <a:cs typeface="Arial" panose="020B0604020202020204" pitchFamily="34" charset="0"/>
+              </a:rPr>
+              <a:t>Kalman</a:t>
+            </a:r>
+            <a:r>
+              <a:rPr lang="en-US" dirty="0">
+                <a:latin typeface="Arial" panose="020B0604020202020204" pitchFamily="34" charset="0"/>
+                <a:cs typeface="Arial" panose="020B0604020202020204" pitchFamily="34" charset="0"/>
+              </a:rPr>
+              <a:t> filter on </a:t>
+            </a:r>
+            <a:r>
+              <a:rPr lang="en-US" dirty="0" err="1">
+                <a:latin typeface="Arial" panose="020B0604020202020204" pitchFamily="34" charset="0"/>
+                <a:cs typeface="Arial" panose="020B0604020202020204" pitchFamily="34" charset="0"/>
+              </a:rPr>
+              <a:t>pwelch</a:t>
+            </a:r>
+            <a:r>
+              <a:rPr lang="en-US" dirty="0">
+                <a:latin typeface="Arial" panose="020B0604020202020204" pitchFamily="34" charset="0"/>
+                <a:cs typeface="Arial" panose="020B0604020202020204" pitchFamily="34" charset="0"/>
+              </a:rPr>
+              <a:t> of time-domain signal works best with stim off (if comfortable for patient)</a:t>
+            </a:r>
+          </a:p>
+          <a:p>
+            <a:endParaRPr lang="en-US" dirty="0">
+              <a:latin typeface="Arial" panose="020B0604020202020204" pitchFamily="34" charset="0"/>
+              <a:cs typeface="Arial" panose="020B0604020202020204" pitchFamily="34" charset="0"/>
+            </a:endParaRPr>
           </a:p>
         </p:txBody>
       </p:sp>
     </p:spTree>
     <p:extLst>
       <p:ext uri="{BB962C8B-B14F-4D97-AF65-F5344CB8AC3E}">
-        <p14:creationId xmlns:p14="http://schemas.microsoft.com/office/powerpoint/2010/main" val="3701378910"/>
+        <p14:creationId xmlns:p14="http://schemas.microsoft.com/office/powerpoint/2010/main" val="514844060"/>
       </p:ext>
     </p:extLst>
   </p:cSld>
   <p:clrMapOvr>
     <a:masterClrMapping/>
   </p:clrMapOvr>
-</p:sld>
-</file>
-
-<file path=ppt/slides/slide3.xml><?xml version="1.0" encoding="utf-8"?>
-<p:sld xmlns:a="http://schemas.openxmlformats.org/drawingml/2006/main" xmlns:r="http://schemas.openxmlformats.org/officeDocument/2006/relationships" xmlns:p="http://schemas.openxmlformats.org/presentationml/2006/main">
-  <p:cSld>
-    <p:spTree>
-      <p:nvGrpSpPr>
-        <p:cNvPr id="1" name=""/>
-        <p:cNvGrpSpPr/>
-        <p:nvPr/>
-      </p:nvGrpSpPr>
-      <p:grpSpPr>
-        <a:xfrm>
-          <a:off x="0" y="0"/>
-          <a:ext cx="0" cy="0"/>
-          <a:chOff x="0" y="0"/>
-          <a:chExt cx="0" cy="0"/>
-        </a:xfrm>
-      </p:grpSpPr>
-      <p:pic>
-        <p:nvPicPr>
-          <p:cNvPr id="4" name="Picture 3"/>
-          <p:cNvPicPr>
-            <a:picLocks noChangeAspect="1"/>
-          </p:cNvPicPr>
-          <p:nvPr/>
-        </p:nvPicPr>
-        <p:blipFill>
-          <a:blip r:embed="rId2"/>
-          <a:stretch>
-            <a:fillRect/>
-          </a:stretch>
-        </p:blipFill>
-        <p:spPr>
-          <a:xfrm>
-            <a:off x="2209800" y="654050"/>
-            <a:ext cx="7772400" cy="5549900"/>
-          </a:xfrm>
-          <a:prstGeom prst="rect">
-            <a:avLst/>
-          </a:prstGeom>
-        </p:spPr>
-      </p:pic>
-    </p:spTree>
-    <p:extLst>
-      <p:ext uri="{BB962C8B-B14F-4D97-AF65-F5344CB8AC3E}">
-        <p14:creationId xmlns:p14="http://schemas.microsoft.com/office/powerpoint/2010/main" val="1061582592"/>
-      </p:ext>
-    </p:extLst>
-  </p:cSld>
-  <p:clrMapOvr>
-    <a:masterClrMapping/>
-  </p:clrMapOvr>
+  <p:timing>
+    <p:tnLst>
+      <p:par>
+        <p:cTn id="1" dur="indefinite" restart="never" nodeType="tmRoot"/>
+      </p:par>
+    </p:tnLst>
+  </p:timing>
 </p:sld>
 </file>
 

</xml_diff>